<commit_message>
added two figures to vocab maintenance spec
</commit_message>
<xml_diff>
--- a/diagrams.pptx
+++ b/diagrams.pptx
@@ -9,6 +9,8 @@
     <p:sldId id="259" r:id="rId3"/>
     <p:sldId id="258" r:id="rId4"/>
     <p:sldId id="260" r:id="rId5"/>
+    <p:sldId id="261" r:id="rId6"/>
+    <p:sldId id="262" r:id="rId7"/>
   </p:sldIdLst>
   <p:sldSz cx="9144000" cy="6858000" type="screen4x3"/>
   <p:notesSz cx="6858000" cy="9144000"/>
@@ -5629,10 +5631,6 @@
               </a:rPr>
               <a:t>dcterms:hasFormat</a:t>
             </a:r>
-            <a:endParaRPr lang="en-US" sz="1400" dirty="0">
-              <a:latin typeface="Courier New" panose="02070309020205020404" pitchFamily="49" charset="0"/>
-              <a:cs typeface="Courier New" panose="02070309020205020404" pitchFamily="49" charset="0"/>
-            </a:endParaRPr>
           </a:p>
         </p:txBody>
       </p:sp>
@@ -5665,10 +5663,6 @@
               </a:rPr>
               <a:t>dcterms:hasFormat</a:t>
             </a:r>
-            <a:endParaRPr lang="en-US" sz="1400" dirty="0">
-              <a:latin typeface="Courier New" panose="02070309020205020404" pitchFamily="49" charset="0"/>
-              <a:cs typeface="Courier New" panose="02070309020205020404" pitchFamily="49" charset="0"/>
-            </a:endParaRPr>
           </a:p>
         </p:txBody>
       </p:sp>
@@ -5749,6 +5743,1761 @@
       </p:par>
     </p:tnLst>
   </p:timing>
+</p:sld>
+</file>
+
+<file path=ppt/slides/slide5.xml><?xml version="1.0" encoding="utf-8"?>
+<p:sld xmlns:a="http://schemas.openxmlformats.org/drawingml/2006/main" xmlns:r="http://schemas.openxmlformats.org/officeDocument/2006/relationships" xmlns:p="http://schemas.openxmlformats.org/presentationml/2006/main">
+  <p:cSld>
+    <p:spTree>
+      <p:nvGrpSpPr>
+        <p:cNvPr id="1" name=""/>
+        <p:cNvGrpSpPr/>
+        <p:nvPr/>
+      </p:nvGrpSpPr>
+      <p:grpSpPr>
+        <a:xfrm>
+          <a:off x="0" y="0"/>
+          <a:ext cx="0" cy="0"/>
+          <a:chOff x="0" y="0"/>
+          <a:chExt cx="0" cy="0"/>
+        </a:xfrm>
+      </p:grpSpPr>
+      <p:sp>
+        <p:nvSpPr>
+          <p:cNvPr id="2" name="Flowchart: Decision 1"/>
+          <p:cNvSpPr/>
+          <p:nvPr/>
+        </p:nvSpPr>
+        <p:spPr>
+          <a:xfrm>
+            <a:off x="1372008" y="1531356"/>
+            <a:ext cx="2499781" cy="1075208"/>
+          </a:xfrm>
+          <a:prstGeom prst="flowChartDecision">
+            <a:avLst/>
+          </a:prstGeom>
+          <a:noFill/>
+          <a:ln w="31750">
+            <a:solidFill>
+              <a:schemeClr val="tx1"/>
+            </a:solidFill>
+          </a:ln>
+        </p:spPr>
+        <p:style>
+          <a:lnRef idx="2">
+            <a:schemeClr val="accent1">
+              <a:shade val="50000"/>
+            </a:schemeClr>
+          </a:lnRef>
+          <a:fillRef idx="1">
+            <a:schemeClr val="accent1"/>
+          </a:fillRef>
+          <a:effectRef idx="0">
+            <a:schemeClr val="accent1"/>
+          </a:effectRef>
+          <a:fontRef idx="minor">
+            <a:schemeClr val="lt1"/>
+          </a:fontRef>
+        </p:style>
+        <p:txBody>
+          <a:bodyPr rtlCol="0" anchor="ctr"/>
+          <a:lstStyle/>
+          <a:p>
+            <a:pPr algn="ctr"/>
+            <a:r>
+              <a:rPr lang="en-US" sz="1200" dirty="0" smtClean="0">
+                <a:solidFill>
+                  <a:schemeClr val="tx1"/>
+                </a:solidFill>
+              </a:rPr>
+              <a:t>errata, cosmetic changes, changes to examples</a:t>
+            </a:r>
+            <a:endParaRPr lang="en-US" sz="1200" dirty="0">
+              <a:solidFill>
+                <a:schemeClr val="tx1"/>
+              </a:solidFill>
+            </a:endParaRPr>
+          </a:p>
+        </p:txBody>
+      </p:sp>
+      <p:sp>
+        <p:nvSpPr>
+          <p:cNvPr id="3" name="Flowchart: Decision 2"/>
+          <p:cNvSpPr/>
+          <p:nvPr/>
+        </p:nvSpPr>
+        <p:spPr>
+          <a:xfrm>
+            <a:off x="4431610" y="1570349"/>
+            <a:ext cx="1927916" cy="997221"/>
+          </a:xfrm>
+          <a:prstGeom prst="flowChartDecision">
+            <a:avLst/>
+          </a:prstGeom>
+          <a:noFill/>
+          <a:ln w="31750">
+            <a:solidFill>
+              <a:schemeClr val="tx1"/>
+            </a:solidFill>
+          </a:ln>
+        </p:spPr>
+        <p:style>
+          <a:lnRef idx="2">
+            <a:schemeClr val="accent1">
+              <a:shade val="50000"/>
+            </a:schemeClr>
+          </a:lnRef>
+          <a:fillRef idx="1">
+            <a:schemeClr val="accent1"/>
+          </a:fillRef>
+          <a:effectRef idx="0">
+            <a:schemeClr val="accent1"/>
+          </a:effectRef>
+          <a:fontRef idx="minor">
+            <a:schemeClr val="lt1"/>
+          </a:fontRef>
+        </p:style>
+        <p:txBody>
+          <a:bodyPr rtlCol="0" anchor="ctr"/>
+          <a:lstStyle/>
+          <a:p>
+            <a:pPr algn="ctr"/>
+            <a:r>
+              <a:rPr lang="en-US" sz="1200" dirty="0" smtClean="0">
+                <a:solidFill>
+                  <a:schemeClr val="tx1"/>
+                </a:solidFill>
+              </a:rPr>
+              <a:t>changes to normative content?</a:t>
+            </a:r>
+            <a:endParaRPr lang="en-US" sz="1200" dirty="0">
+              <a:solidFill>
+                <a:schemeClr val="tx1"/>
+              </a:solidFill>
+            </a:endParaRPr>
+          </a:p>
+        </p:txBody>
+      </p:sp>
+      <p:cxnSp>
+        <p:nvCxnSpPr>
+          <p:cNvPr id="5" name="Straight Arrow Connector 4"/>
+          <p:cNvCxnSpPr>
+            <a:endCxn id="2" idx="1"/>
+          </p:cNvCxnSpPr>
+          <p:nvPr/>
+        </p:nvCxnSpPr>
+        <p:spPr>
+          <a:xfrm>
+            <a:off x="950976" y="2068959"/>
+            <a:ext cx="421032" cy="1"/>
+          </a:xfrm>
+          <a:prstGeom prst="straightConnector1">
+            <a:avLst/>
+          </a:prstGeom>
+          <a:ln w="31750">
+            <a:solidFill>
+              <a:schemeClr val="tx1"/>
+            </a:solidFill>
+            <a:tailEnd type="triangle" w="lg" len="lg"/>
+          </a:ln>
+        </p:spPr>
+        <p:style>
+          <a:lnRef idx="1">
+            <a:schemeClr val="accent1"/>
+          </a:lnRef>
+          <a:fillRef idx="0">
+            <a:schemeClr val="accent1"/>
+          </a:fillRef>
+          <a:effectRef idx="0">
+            <a:schemeClr val="accent1"/>
+          </a:effectRef>
+          <a:fontRef idx="minor">
+            <a:schemeClr val="tx1"/>
+          </a:fontRef>
+        </p:style>
+      </p:cxnSp>
+      <p:cxnSp>
+        <p:nvCxnSpPr>
+          <p:cNvPr id="11" name="Straight Arrow Connector 10"/>
+          <p:cNvCxnSpPr>
+            <a:stCxn id="2" idx="0"/>
+          </p:cNvCxnSpPr>
+          <p:nvPr/>
+        </p:nvCxnSpPr>
+        <p:spPr>
+          <a:xfrm flipH="1" flipV="1">
+            <a:off x="2621898" y="985133"/>
+            <a:ext cx="1" cy="546223"/>
+          </a:xfrm>
+          <a:prstGeom prst="straightConnector1">
+            <a:avLst/>
+          </a:prstGeom>
+          <a:ln w="31750">
+            <a:solidFill>
+              <a:schemeClr val="tx1"/>
+            </a:solidFill>
+            <a:tailEnd type="triangle" w="lg" len="lg"/>
+          </a:ln>
+        </p:spPr>
+        <p:style>
+          <a:lnRef idx="1">
+            <a:schemeClr val="accent1"/>
+          </a:lnRef>
+          <a:fillRef idx="0">
+            <a:schemeClr val="accent1"/>
+          </a:fillRef>
+          <a:effectRef idx="0">
+            <a:schemeClr val="accent1"/>
+          </a:effectRef>
+          <a:fontRef idx="minor">
+            <a:schemeClr val="tx1"/>
+          </a:fontRef>
+        </p:style>
+      </p:cxnSp>
+      <p:sp>
+        <p:nvSpPr>
+          <p:cNvPr id="16" name="TextBox 15"/>
+          <p:cNvSpPr txBox="1"/>
+          <p:nvPr/>
+        </p:nvSpPr>
+        <p:spPr>
+          <a:xfrm>
+            <a:off x="2922254" y="1051775"/>
+            <a:ext cx="491225" cy="369332"/>
+          </a:xfrm>
+          <a:prstGeom prst="rect">
+            <a:avLst/>
+          </a:prstGeom>
+          <a:noFill/>
+        </p:spPr>
+        <p:txBody>
+          <a:bodyPr wrap="none" rtlCol="0">
+            <a:spAutoFit/>
+          </a:bodyPr>
+          <a:lstStyle/>
+          <a:p>
+            <a:r>
+              <a:rPr lang="en-US" dirty="0" smtClean="0"/>
+              <a:t>yes</a:t>
+            </a:r>
+            <a:endParaRPr lang="en-US" dirty="0"/>
+          </a:p>
+        </p:txBody>
+      </p:sp>
+      <p:sp>
+        <p:nvSpPr>
+          <p:cNvPr id="17" name="TextBox 16"/>
+          <p:cNvSpPr txBox="1"/>
+          <p:nvPr/>
+        </p:nvSpPr>
+        <p:spPr>
+          <a:xfrm>
+            <a:off x="3871789" y="2068959"/>
+            <a:ext cx="428322" cy="369332"/>
+          </a:xfrm>
+          <a:prstGeom prst="rect">
+            <a:avLst/>
+          </a:prstGeom>
+          <a:noFill/>
+        </p:spPr>
+        <p:txBody>
+          <a:bodyPr wrap="none" rtlCol="0">
+            <a:spAutoFit/>
+          </a:bodyPr>
+          <a:lstStyle/>
+          <a:p>
+            <a:r>
+              <a:rPr lang="en-US" dirty="0" smtClean="0"/>
+              <a:t>no</a:t>
+            </a:r>
+            <a:endParaRPr lang="en-US" dirty="0"/>
+          </a:p>
+        </p:txBody>
+      </p:sp>
+      <p:cxnSp>
+        <p:nvCxnSpPr>
+          <p:cNvPr id="18" name="Straight Arrow Connector 17"/>
+          <p:cNvCxnSpPr>
+            <a:stCxn id="2" idx="3"/>
+            <a:endCxn id="3" idx="1"/>
+          </p:cNvCxnSpPr>
+          <p:nvPr/>
+        </p:nvCxnSpPr>
+        <p:spPr>
+          <a:xfrm>
+            <a:off x="3871789" y="2068960"/>
+            <a:ext cx="559821" cy="0"/>
+          </a:xfrm>
+          <a:prstGeom prst="straightConnector1">
+            <a:avLst/>
+          </a:prstGeom>
+          <a:ln w="31750">
+            <a:solidFill>
+              <a:schemeClr val="tx1"/>
+            </a:solidFill>
+            <a:tailEnd type="triangle" w="lg" len="lg"/>
+          </a:ln>
+        </p:spPr>
+        <p:style>
+          <a:lnRef idx="1">
+            <a:schemeClr val="accent1"/>
+          </a:lnRef>
+          <a:fillRef idx="0">
+            <a:schemeClr val="accent1"/>
+          </a:fillRef>
+          <a:effectRef idx="0">
+            <a:schemeClr val="accent1"/>
+          </a:effectRef>
+          <a:fontRef idx="minor">
+            <a:schemeClr val="tx1"/>
+          </a:fontRef>
+        </p:style>
+      </p:cxnSp>
+      <p:sp>
+        <p:nvSpPr>
+          <p:cNvPr id="21" name="TextBox 20"/>
+          <p:cNvSpPr txBox="1"/>
+          <p:nvPr/>
+        </p:nvSpPr>
+        <p:spPr>
+          <a:xfrm>
+            <a:off x="1372008" y="633749"/>
+            <a:ext cx="2388346" cy="307777"/>
+          </a:xfrm>
+          <a:prstGeom prst="rect">
+            <a:avLst/>
+          </a:prstGeom>
+          <a:noFill/>
+        </p:spPr>
+        <p:txBody>
+          <a:bodyPr wrap="none" rtlCol="0">
+            <a:spAutoFit/>
+          </a:bodyPr>
+          <a:lstStyle/>
+          <a:p>
+            <a:r>
+              <a:rPr lang="en-US" sz="1400" dirty="0" smtClean="0"/>
+              <a:t>Interest Group makes changes</a:t>
+            </a:r>
+            <a:endParaRPr lang="en-US" sz="1400" dirty="0"/>
+          </a:p>
+        </p:txBody>
+      </p:sp>
+      <p:cxnSp>
+        <p:nvCxnSpPr>
+          <p:cNvPr id="22" name="Straight Arrow Connector 21"/>
+          <p:cNvCxnSpPr/>
+          <p:nvPr/>
+        </p:nvCxnSpPr>
+        <p:spPr>
+          <a:xfrm flipV="1">
+            <a:off x="7913068" y="1051775"/>
+            <a:ext cx="0" cy="501442"/>
+          </a:xfrm>
+          <a:prstGeom prst="straightConnector1">
+            <a:avLst/>
+          </a:prstGeom>
+          <a:ln w="31750">
+            <a:solidFill>
+              <a:schemeClr val="tx1"/>
+            </a:solidFill>
+            <a:tailEnd type="triangle" w="lg" len="lg"/>
+          </a:ln>
+        </p:spPr>
+        <p:style>
+          <a:lnRef idx="1">
+            <a:schemeClr val="accent1"/>
+          </a:lnRef>
+          <a:fillRef idx="0">
+            <a:schemeClr val="accent1"/>
+          </a:fillRef>
+          <a:effectRef idx="0">
+            <a:schemeClr val="accent1"/>
+          </a:effectRef>
+          <a:fontRef idx="minor">
+            <a:schemeClr val="tx1"/>
+          </a:fontRef>
+        </p:style>
+      </p:cxnSp>
+      <p:sp>
+        <p:nvSpPr>
+          <p:cNvPr id="25" name="TextBox 24"/>
+          <p:cNvSpPr txBox="1"/>
+          <p:nvPr/>
+        </p:nvSpPr>
+        <p:spPr>
+          <a:xfrm>
+            <a:off x="6293149" y="2070220"/>
+            <a:ext cx="428322" cy="369332"/>
+          </a:xfrm>
+          <a:prstGeom prst="rect">
+            <a:avLst/>
+          </a:prstGeom>
+          <a:noFill/>
+        </p:spPr>
+        <p:txBody>
+          <a:bodyPr wrap="none" rtlCol="0">
+            <a:spAutoFit/>
+          </a:bodyPr>
+          <a:lstStyle/>
+          <a:p>
+            <a:r>
+              <a:rPr lang="en-US" dirty="0" smtClean="0"/>
+              <a:t>no</a:t>
+            </a:r>
+            <a:endParaRPr lang="en-US" dirty="0"/>
+          </a:p>
+        </p:txBody>
+      </p:sp>
+      <p:sp>
+        <p:nvSpPr>
+          <p:cNvPr id="26" name="TextBox 25"/>
+          <p:cNvSpPr txBox="1"/>
+          <p:nvPr/>
+        </p:nvSpPr>
+        <p:spPr>
+          <a:xfrm>
+            <a:off x="6071764" y="465591"/>
+            <a:ext cx="2974700" cy="523220"/>
+          </a:xfrm>
+          <a:prstGeom prst="rect">
+            <a:avLst/>
+          </a:prstGeom>
+          <a:noFill/>
+        </p:spPr>
+        <p:txBody>
+          <a:bodyPr wrap="square" rtlCol="0">
+            <a:spAutoFit/>
+          </a:bodyPr>
+          <a:lstStyle/>
+          <a:p>
+            <a:r>
+              <a:rPr lang="en-US" sz="1400" dirty="0" smtClean="0"/>
+              <a:t>Interest Group makes changes and notifies community via </a:t>
+            </a:r>
+            <a:r>
+              <a:rPr lang="en-US" sz="1400" dirty="0" err="1" smtClean="0"/>
+              <a:t>tdwg</a:t>
+            </a:r>
+            <a:r>
+              <a:rPr lang="en-US" sz="1400" dirty="0" smtClean="0"/>
+              <a:t>-content</a:t>
+            </a:r>
+            <a:endParaRPr lang="en-US" sz="1400" dirty="0"/>
+          </a:p>
+        </p:txBody>
+      </p:sp>
+      <p:cxnSp>
+        <p:nvCxnSpPr>
+          <p:cNvPr id="30" name="Straight Arrow Connector 29"/>
+          <p:cNvCxnSpPr>
+            <a:stCxn id="3" idx="2"/>
+          </p:cNvCxnSpPr>
+          <p:nvPr/>
+        </p:nvCxnSpPr>
+        <p:spPr>
+          <a:xfrm>
+            <a:off x="5395568" y="2567570"/>
+            <a:ext cx="0" cy="581538"/>
+          </a:xfrm>
+          <a:prstGeom prst="straightConnector1">
+            <a:avLst/>
+          </a:prstGeom>
+          <a:ln w="31750">
+            <a:solidFill>
+              <a:schemeClr val="tx1"/>
+            </a:solidFill>
+            <a:tailEnd type="triangle" w="lg" len="lg"/>
+          </a:ln>
+        </p:spPr>
+        <p:style>
+          <a:lnRef idx="1">
+            <a:schemeClr val="accent1"/>
+          </a:lnRef>
+          <a:fillRef idx="0">
+            <a:schemeClr val="accent1"/>
+          </a:fillRef>
+          <a:effectRef idx="0">
+            <a:schemeClr val="accent1"/>
+          </a:effectRef>
+          <a:fontRef idx="minor">
+            <a:schemeClr val="tx1"/>
+          </a:fontRef>
+        </p:style>
+      </p:cxnSp>
+      <p:sp>
+        <p:nvSpPr>
+          <p:cNvPr id="33" name="TextBox 32"/>
+          <p:cNvSpPr txBox="1"/>
+          <p:nvPr/>
+        </p:nvSpPr>
+        <p:spPr>
+          <a:xfrm>
+            <a:off x="7912682" y="2589431"/>
+            <a:ext cx="491225" cy="369332"/>
+          </a:xfrm>
+          <a:prstGeom prst="rect">
+            <a:avLst/>
+          </a:prstGeom>
+          <a:noFill/>
+        </p:spPr>
+        <p:txBody>
+          <a:bodyPr wrap="none" rtlCol="0">
+            <a:spAutoFit/>
+          </a:bodyPr>
+          <a:lstStyle/>
+          <a:p>
+            <a:r>
+              <a:rPr lang="en-US" dirty="0" smtClean="0"/>
+              <a:t>yes</a:t>
+            </a:r>
+            <a:endParaRPr lang="en-US" dirty="0"/>
+          </a:p>
+        </p:txBody>
+      </p:sp>
+      <p:sp>
+        <p:nvSpPr>
+          <p:cNvPr id="55" name="Flowchart: Decision 54"/>
+          <p:cNvSpPr/>
+          <p:nvPr/>
+        </p:nvSpPr>
+        <p:spPr>
+          <a:xfrm>
+            <a:off x="6931391" y="1553217"/>
+            <a:ext cx="1963354" cy="1036214"/>
+          </a:xfrm>
+          <a:prstGeom prst="flowChartDecision">
+            <a:avLst/>
+          </a:prstGeom>
+          <a:noFill/>
+          <a:ln w="31750">
+            <a:solidFill>
+              <a:schemeClr val="tx1"/>
+            </a:solidFill>
+          </a:ln>
+        </p:spPr>
+        <p:style>
+          <a:lnRef idx="2">
+            <a:schemeClr val="accent1">
+              <a:shade val="50000"/>
+            </a:schemeClr>
+          </a:lnRef>
+          <a:fillRef idx="1">
+            <a:schemeClr val="accent1"/>
+          </a:fillRef>
+          <a:effectRef idx="0">
+            <a:schemeClr val="accent1"/>
+          </a:effectRef>
+          <a:fontRef idx="minor">
+            <a:schemeClr val="lt1"/>
+          </a:fontRef>
+        </p:style>
+        <p:txBody>
+          <a:bodyPr rtlCol="0" anchor="ctr"/>
+          <a:lstStyle/>
+          <a:p>
+            <a:pPr algn="ctr"/>
+            <a:r>
+              <a:rPr lang="en-US" sz="1200" dirty="0" smtClean="0">
+                <a:solidFill>
+                  <a:schemeClr val="tx1"/>
+                </a:solidFill>
+              </a:rPr>
+              <a:t>significant changes</a:t>
+            </a:r>
+            <a:endParaRPr lang="en-US" sz="1200" dirty="0">
+              <a:solidFill>
+                <a:schemeClr val="tx1"/>
+              </a:solidFill>
+            </a:endParaRPr>
+          </a:p>
+        </p:txBody>
+      </p:sp>
+      <p:cxnSp>
+        <p:nvCxnSpPr>
+          <p:cNvPr id="75" name="Straight Arrow Connector 74"/>
+          <p:cNvCxnSpPr>
+            <a:stCxn id="3" idx="3"/>
+            <a:endCxn id="55" idx="1"/>
+          </p:cNvCxnSpPr>
+          <p:nvPr/>
+        </p:nvCxnSpPr>
+        <p:spPr>
+          <a:xfrm>
+            <a:off x="6359526" y="2068960"/>
+            <a:ext cx="571865" cy="2364"/>
+          </a:xfrm>
+          <a:prstGeom prst="straightConnector1">
+            <a:avLst/>
+          </a:prstGeom>
+          <a:ln w="31750">
+            <a:solidFill>
+              <a:schemeClr val="tx1"/>
+            </a:solidFill>
+            <a:tailEnd type="triangle" w="lg" len="lg"/>
+          </a:ln>
+        </p:spPr>
+        <p:style>
+          <a:lnRef idx="1">
+            <a:schemeClr val="accent1"/>
+          </a:lnRef>
+          <a:fillRef idx="0">
+            <a:schemeClr val="accent1"/>
+          </a:fillRef>
+          <a:effectRef idx="0">
+            <a:schemeClr val="accent1"/>
+          </a:effectRef>
+          <a:fontRef idx="minor">
+            <a:schemeClr val="tx1"/>
+          </a:fontRef>
+        </p:style>
+      </p:cxnSp>
+      <p:sp>
+        <p:nvSpPr>
+          <p:cNvPr id="82" name="TextBox 81"/>
+          <p:cNvSpPr txBox="1"/>
+          <p:nvPr/>
+        </p:nvSpPr>
+        <p:spPr>
+          <a:xfrm>
+            <a:off x="7975585" y="1144204"/>
+            <a:ext cx="428322" cy="369332"/>
+          </a:xfrm>
+          <a:prstGeom prst="rect">
+            <a:avLst/>
+          </a:prstGeom>
+          <a:noFill/>
+        </p:spPr>
+        <p:txBody>
+          <a:bodyPr wrap="none" rtlCol="0">
+            <a:spAutoFit/>
+          </a:bodyPr>
+          <a:lstStyle/>
+          <a:p>
+            <a:r>
+              <a:rPr lang="en-US" dirty="0" smtClean="0"/>
+              <a:t>no</a:t>
+            </a:r>
+            <a:endParaRPr lang="en-US" dirty="0"/>
+          </a:p>
+        </p:txBody>
+      </p:sp>
+      <p:sp>
+        <p:nvSpPr>
+          <p:cNvPr id="87" name="TextBox 86"/>
+          <p:cNvSpPr txBox="1"/>
+          <p:nvPr/>
+        </p:nvSpPr>
+        <p:spPr>
+          <a:xfrm>
+            <a:off x="5401203" y="2589431"/>
+            <a:ext cx="491225" cy="369332"/>
+          </a:xfrm>
+          <a:prstGeom prst="rect">
+            <a:avLst/>
+          </a:prstGeom>
+          <a:noFill/>
+        </p:spPr>
+        <p:txBody>
+          <a:bodyPr wrap="none" rtlCol="0">
+            <a:spAutoFit/>
+          </a:bodyPr>
+          <a:lstStyle/>
+          <a:p>
+            <a:r>
+              <a:rPr lang="en-US" dirty="0" smtClean="0"/>
+              <a:t>yes</a:t>
+            </a:r>
+            <a:endParaRPr lang="en-US" dirty="0"/>
+          </a:p>
+        </p:txBody>
+      </p:sp>
+      <p:cxnSp>
+        <p:nvCxnSpPr>
+          <p:cNvPr id="89" name="Straight Arrow Connector 88"/>
+          <p:cNvCxnSpPr/>
+          <p:nvPr/>
+        </p:nvCxnSpPr>
+        <p:spPr>
+          <a:xfrm>
+            <a:off x="7913068" y="2589431"/>
+            <a:ext cx="0" cy="581538"/>
+          </a:xfrm>
+          <a:prstGeom prst="straightConnector1">
+            <a:avLst/>
+          </a:prstGeom>
+          <a:ln w="31750">
+            <a:solidFill>
+              <a:schemeClr val="tx1"/>
+            </a:solidFill>
+            <a:tailEnd type="triangle" w="lg" len="lg"/>
+          </a:ln>
+        </p:spPr>
+        <p:style>
+          <a:lnRef idx="1">
+            <a:schemeClr val="accent1"/>
+          </a:lnRef>
+          <a:fillRef idx="0">
+            <a:schemeClr val="accent1"/>
+          </a:fillRef>
+          <a:effectRef idx="0">
+            <a:schemeClr val="accent1"/>
+          </a:effectRef>
+          <a:fontRef idx="minor">
+            <a:schemeClr val="tx1"/>
+          </a:fontRef>
+        </p:style>
+      </p:cxnSp>
+      <p:sp>
+        <p:nvSpPr>
+          <p:cNvPr id="91" name="TextBox 90"/>
+          <p:cNvSpPr txBox="1"/>
+          <p:nvPr/>
+        </p:nvSpPr>
+        <p:spPr>
+          <a:xfrm>
+            <a:off x="5007903" y="3214156"/>
+            <a:ext cx="3427135" cy="523220"/>
+          </a:xfrm>
+          <a:prstGeom prst="rect">
+            <a:avLst/>
+          </a:prstGeom>
+          <a:noFill/>
+        </p:spPr>
+        <p:txBody>
+          <a:bodyPr wrap="square" rtlCol="0">
+            <a:spAutoFit/>
+          </a:bodyPr>
+          <a:lstStyle/>
+          <a:p>
+            <a:r>
+              <a:rPr lang="en-US" sz="1400" dirty="0" smtClean="0"/>
+              <a:t>Full change process invoked including public comment and executive approval</a:t>
+            </a:r>
+            <a:endParaRPr lang="en-US" sz="1400" dirty="0"/>
+          </a:p>
+        </p:txBody>
+      </p:sp>
+      <p:sp>
+        <p:nvSpPr>
+          <p:cNvPr id="92" name="TextBox 91"/>
+          <p:cNvSpPr txBox="1"/>
+          <p:nvPr/>
+        </p:nvSpPr>
+        <p:spPr>
+          <a:xfrm>
+            <a:off x="1135142" y="3907301"/>
+            <a:ext cx="3523529" cy="307777"/>
+          </a:xfrm>
+          <a:prstGeom prst="rect">
+            <a:avLst/>
+          </a:prstGeom>
+          <a:noFill/>
+        </p:spPr>
+        <p:txBody>
+          <a:bodyPr wrap="none" rtlCol="0">
+            <a:spAutoFit/>
+          </a:bodyPr>
+          <a:lstStyle/>
+          <a:p>
+            <a:r>
+              <a:rPr lang="en-US" sz="1400" dirty="0" smtClean="0"/>
+              <a:t>Fig. x. Decision process for document changes</a:t>
+            </a:r>
+            <a:endParaRPr lang="en-US" sz="1400" dirty="0"/>
+          </a:p>
+        </p:txBody>
+      </p:sp>
+      <p:sp>
+        <p:nvSpPr>
+          <p:cNvPr id="94" name="TextBox 93"/>
+          <p:cNvSpPr txBox="1"/>
+          <p:nvPr/>
+        </p:nvSpPr>
+        <p:spPr>
+          <a:xfrm>
+            <a:off x="128333" y="1807349"/>
+            <a:ext cx="886632" cy="523220"/>
+          </a:xfrm>
+          <a:prstGeom prst="rect">
+            <a:avLst/>
+          </a:prstGeom>
+          <a:noFill/>
+        </p:spPr>
+        <p:txBody>
+          <a:bodyPr wrap="square" rtlCol="0">
+            <a:spAutoFit/>
+          </a:bodyPr>
+          <a:lstStyle/>
+          <a:p>
+            <a:r>
+              <a:rPr lang="en-US" sz="1400" dirty="0" smtClean="0"/>
+              <a:t>Change proposed</a:t>
+            </a:r>
+            <a:endParaRPr lang="en-US" sz="1400" dirty="0"/>
+          </a:p>
+        </p:txBody>
+      </p:sp>
+    </p:spTree>
+    <p:extLst>
+      <p:ext uri="{BB962C8B-B14F-4D97-AF65-F5344CB8AC3E}">
+        <p14:creationId xmlns:p14="http://schemas.microsoft.com/office/powerpoint/2010/main" val="99291961"/>
+      </p:ext>
+    </p:extLst>
+  </p:cSld>
+  <p:clrMapOvr>
+    <a:masterClrMapping/>
+  </p:clrMapOvr>
+</p:sld>
+</file>
+
+<file path=ppt/slides/slide6.xml><?xml version="1.0" encoding="utf-8"?>
+<p:sld xmlns:a="http://schemas.openxmlformats.org/drawingml/2006/main" xmlns:r="http://schemas.openxmlformats.org/officeDocument/2006/relationships" xmlns:p="http://schemas.openxmlformats.org/presentationml/2006/main">
+  <p:cSld>
+    <p:spTree>
+      <p:nvGrpSpPr>
+        <p:cNvPr id="1" name=""/>
+        <p:cNvGrpSpPr/>
+        <p:nvPr/>
+      </p:nvGrpSpPr>
+      <p:grpSpPr>
+        <a:xfrm>
+          <a:off x="0" y="0"/>
+          <a:ext cx="0" cy="0"/>
+          <a:chOff x="0" y="0"/>
+          <a:chExt cx="0" cy="0"/>
+        </a:xfrm>
+      </p:grpSpPr>
+      <p:sp>
+        <p:nvSpPr>
+          <p:cNvPr id="22" name="Flowchart: Decision 21"/>
+          <p:cNvSpPr/>
+          <p:nvPr/>
+        </p:nvSpPr>
+        <p:spPr>
+          <a:xfrm>
+            <a:off x="1245745" y="1397014"/>
+            <a:ext cx="1945634" cy="1331755"/>
+          </a:xfrm>
+          <a:prstGeom prst="flowChartDecision">
+            <a:avLst/>
+          </a:prstGeom>
+          <a:noFill/>
+          <a:ln w="31750">
+            <a:solidFill>
+              <a:schemeClr val="tx1"/>
+            </a:solidFill>
+          </a:ln>
+        </p:spPr>
+        <p:style>
+          <a:lnRef idx="2">
+            <a:schemeClr val="accent1">
+              <a:shade val="50000"/>
+            </a:schemeClr>
+          </a:lnRef>
+          <a:fillRef idx="1">
+            <a:schemeClr val="accent1"/>
+          </a:fillRef>
+          <a:effectRef idx="0">
+            <a:schemeClr val="accent1"/>
+          </a:effectRef>
+          <a:fontRef idx="minor">
+            <a:schemeClr val="lt1"/>
+          </a:fontRef>
+        </p:style>
+        <p:txBody>
+          <a:bodyPr rtlCol="0" anchor="ctr"/>
+          <a:lstStyle/>
+          <a:p>
+            <a:pPr algn="ctr"/>
+            <a:r>
+              <a:rPr lang="en-US" sz="1200" dirty="0" smtClean="0">
+                <a:solidFill>
+                  <a:schemeClr val="tx1"/>
+                </a:solidFill>
+              </a:rPr>
+              <a:t>meets demand, efficacy, and stability requirement .</a:t>
+            </a:r>
+            <a:endParaRPr lang="en-US" sz="1200" dirty="0">
+              <a:solidFill>
+                <a:schemeClr val="tx1"/>
+              </a:solidFill>
+            </a:endParaRPr>
+          </a:p>
+        </p:txBody>
+      </p:sp>
+      <p:sp>
+        <p:nvSpPr>
+          <p:cNvPr id="23" name="Flowchart: Decision 22"/>
+          <p:cNvSpPr/>
+          <p:nvPr/>
+        </p:nvSpPr>
+        <p:spPr>
+          <a:xfrm>
+            <a:off x="3763244" y="1570349"/>
+            <a:ext cx="1927916" cy="997221"/>
+          </a:xfrm>
+          <a:prstGeom prst="flowChartDecision">
+            <a:avLst/>
+          </a:prstGeom>
+          <a:noFill/>
+          <a:ln w="31750">
+            <a:solidFill>
+              <a:schemeClr val="tx1"/>
+            </a:solidFill>
+          </a:ln>
+        </p:spPr>
+        <p:style>
+          <a:lnRef idx="2">
+            <a:schemeClr val="accent1">
+              <a:shade val="50000"/>
+            </a:schemeClr>
+          </a:lnRef>
+          <a:fillRef idx="1">
+            <a:schemeClr val="accent1"/>
+          </a:fillRef>
+          <a:effectRef idx="0">
+            <a:schemeClr val="accent1"/>
+          </a:effectRef>
+          <a:fontRef idx="minor">
+            <a:schemeClr val="lt1"/>
+          </a:fontRef>
+        </p:style>
+        <p:txBody>
+          <a:bodyPr rtlCol="0" anchor="ctr"/>
+          <a:lstStyle/>
+          <a:p>
+            <a:pPr algn="ctr"/>
+            <a:r>
+              <a:rPr lang="en-US" sz="1200" dirty="0" smtClean="0">
+                <a:solidFill>
+                  <a:schemeClr val="tx1"/>
+                </a:solidFill>
+              </a:rPr>
+              <a:t>consensus achieved within 30 days?</a:t>
+            </a:r>
+            <a:endParaRPr lang="en-US" sz="1200" dirty="0">
+              <a:solidFill>
+                <a:schemeClr val="tx1"/>
+              </a:solidFill>
+            </a:endParaRPr>
+          </a:p>
+        </p:txBody>
+      </p:sp>
+      <p:cxnSp>
+        <p:nvCxnSpPr>
+          <p:cNvPr id="24" name="Straight Arrow Connector 23"/>
+          <p:cNvCxnSpPr>
+            <a:endCxn id="22" idx="1"/>
+          </p:cNvCxnSpPr>
+          <p:nvPr/>
+        </p:nvCxnSpPr>
+        <p:spPr>
+          <a:xfrm>
+            <a:off x="703792" y="2062892"/>
+            <a:ext cx="541953" cy="0"/>
+          </a:xfrm>
+          <a:prstGeom prst="straightConnector1">
+            <a:avLst/>
+          </a:prstGeom>
+          <a:ln w="31750">
+            <a:solidFill>
+              <a:schemeClr val="tx1"/>
+            </a:solidFill>
+            <a:tailEnd type="triangle" w="lg" len="lg"/>
+          </a:ln>
+        </p:spPr>
+        <p:style>
+          <a:lnRef idx="1">
+            <a:schemeClr val="accent1"/>
+          </a:lnRef>
+          <a:fillRef idx="0">
+            <a:schemeClr val="accent1"/>
+          </a:fillRef>
+          <a:effectRef idx="0">
+            <a:schemeClr val="accent1"/>
+          </a:effectRef>
+          <a:fontRef idx="minor">
+            <a:schemeClr val="tx1"/>
+          </a:fontRef>
+        </p:style>
+      </p:cxnSp>
+      <p:cxnSp>
+        <p:nvCxnSpPr>
+          <p:cNvPr id="25" name="Straight Arrow Connector 24"/>
+          <p:cNvCxnSpPr>
+            <a:stCxn id="22" idx="2"/>
+          </p:cNvCxnSpPr>
+          <p:nvPr/>
+        </p:nvCxnSpPr>
+        <p:spPr>
+          <a:xfrm>
+            <a:off x="2218562" y="2728769"/>
+            <a:ext cx="0" cy="420339"/>
+          </a:xfrm>
+          <a:prstGeom prst="straightConnector1">
+            <a:avLst/>
+          </a:prstGeom>
+          <a:ln w="31750">
+            <a:solidFill>
+              <a:schemeClr val="tx1"/>
+            </a:solidFill>
+            <a:tailEnd type="triangle" w="lg" len="lg"/>
+          </a:ln>
+        </p:spPr>
+        <p:style>
+          <a:lnRef idx="1">
+            <a:schemeClr val="accent1"/>
+          </a:lnRef>
+          <a:fillRef idx="0">
+            <a:schemeClr val="accent1"/>
+          </a:fillRef>
+          <a:effectRef idx="0">
+            <a:schemeClr val="accent1"/>
+          </a:effectRef>
+          <a:fontRef idx="minor">
+            <a:schemeClr val="tx1"/>
+          </a:fontRef>
+        </p:style>
+      </p:cxnSp>
+      <p:sp>
+        <p:nvSpPr>
+          <p:cNvPr id="26" name="TextBox 25"/>
+          <p:cNvSpPr txBox="1"/>
+          <p:nvPr/>
+        </p:nvSpPr>
+        <p:spPr>
+          <a:xfrm>
+            <a:off x="3048344" y="2011255"/>
+            <a:ext cx="1419843" cy="800219"/>
+          </a:xfrm>
+          <a:prstGeom prst="rect">
+            <a:avLst/>
+          </a:prstGeom>
+          <a:noFill/>
+        </p:spPr>
+        <p:txBody>
+          <a:bodyPr wrap="square" rtlCol="0">
+            <a:spAutoFit/>
+          </a:bodyPr>
+          <a:lstStyle/>
+          <a:p>
+            <a:r>
+              <a:rPr lang="en-US" dirty="0" smtClean="0"/>
+              <a:t>yes</a:t>
+            </a:r>
+          </a:p>
+          <a:p>
+            <a:r>
+              <a:rPr lang="en-US" sz="1400" dirty="0" smtClean="0"/>
+              <a:t>initiate public comment period</a:t>
+            </a:r>
+            <a:endParaRPr lang="en-US" sz="1400" dirty="0"/>
+          </a:p>
+        </p:txBody>
+      </p:sp>
+      <p:sp>
+        <p:nvSpPr>
+          <p:cNvPr id="27" name="TextBox 26"/>
+          <p:cNvSpPr txBox="1"/>
+          <p:nvPr/>
+        </p:nvSpPr>
+        <p:spPr>
+          <a:xfrm>
+            <a:off x="2455066" y="2589431"/>
+            <a:ext cx="428322" cy="369332"/>
+          </a:xfrm>
+          <a:prstGeom prst="rect">
+            <a:avLst/>
+          </a:prstGeom>
+          <a:noFill/>
+        </p:spPr>
+        <p:txBody>
+          <a:bodyPr wrap="none" rtlCol="0">
+            <a:spAutoFit/>
+          </a:bodyPr>
+          <a:lstStyle/>
+          <a:p>
+            <a:r>
+              <a:rPr lang="en-US" dirty="0" smtClean="0"/>
+              <a:t>no</a:t>
+            </a:r>
+            <a:endParaRPr lang="en-US" dirty="0"/>
+          </a:p>
+        </p:txBody>
+      </p:sp>
+      <p:cxnSp>
+        <p:nvCxnSpPr>
+          <p:cNvPr id="28" name="Straight Arrow Connector 27"/>
+          <p:cNvCxnSpPr>
+            <a:stCxn id="22" idx="3"/>
+            <a:endCxn id="23" idx="1"/>
+          </p:cNvCxnSpPr>
+          <p:nvPr/>
+        </p:nvCxnSpPr>
+        <p:spPr>
+          <a:xfrm>
+            <a:off x="3191379" y="2062892"/>
+            <a:ext cx="571865" cy="6068"/>
+          </a:xfrm>
+          <a:prstGeom prst="straightConnector1">
+            <a:avLst/>
+          </a:prstGeom>
+          <a:ln w="31750">
+            <a:solidFill>
+              <a:schemeClr val="tx1"/>
+            </a:solidFill>
+            <a:tailEnd type="triangle" w="lg" len="lg"/>
+          </a:ln>
+        </p:spPr>
+        <p:style>
+          <a:lnRef idx="1">
+            <a:schemeClr val="accent1"/>
+          </a:lnRef>
+          <a:fillRef idx="0">
+            <a:schemeClr val="accent1"/>
+          </a:fillRef>
+          <a:effectRef idx="0">
+            <a:schemeClr val="accent1"/>
+          </a:effectRef>
+          <a:fontRef idx="minor">
+            <a:schemeClr val="tx1"/>
+          </a:fontRef>
+        </p:style>
+      </p:cxnSp>
+      <p:sp>
+        <p:nvSpPr>
+          <p:cNvPr id="29" name="TextBox 28"/>
+          <p:cNvSpPr txBox="1"/>
+          <p:nvPr/>
+        </p:nvSpPr>
+        <p:spPr>
+          <a:xfrm>
+            <a:off x="1065476" y="3166756"/>
+            <a:ext cx="2550354" cy="307777"/>
+          </a:xfrm>
+          <a:prstGeom prst="rect">
+            <a:avLst/>
+          </a:prstGeom>
+          <a:noFill/>
+        </p:spPr>
+        <p:txBody>
+          <a:bodyPr wrap="square" rtlCol="0">
+            <a:spAutoFit/>
+          </a:bodyPr>
+          <a:lstStyle/>
+          <a:p>
+            <a:r>
+              <a:rPr lang="en-US" sz="1400" dirty="0" smtClean="0"/>
+              <a:t>revise proposal or close issue</a:t>
+            </a:r>
+            <a:endParaRPr lang="en-US" sz="1400" dirty="0"/>
+          </a:p>
+        </p:txBody>
+      </p:sp>
+      <p:cxnSp>
+        <p:nvCxnSpPr>
+          <p:cNvPr id="30" name="Straight Arrow Connector 29"/>
+          <p:cNvCxnSpPr>
+            <a:stCxn id="35" idx="0"/>
+          </p:cNvCxnSpPr>
+          <p:nvPr/>
+        </p:nvCxnSpPr>
+        <p:spPr>
+          <a:xfrm flipH="1" flipV="1">
+            <a:off x="7039048" y="1050799"/>
+            <a:ext cx="1" cy="502418"/>
+          </a:xfrm>
+          <a:prstGeom prst="straightConnector1">
+            <a:avLst/>
+          </a:prstGeom>
+          <a:ln w="31750">
+            <a:solidFill>
+              <a:schemeClr val="tx1"/>
+            </a:solidFill>
+            <a:tailEnd type="none" w="lg" len="lg"/>
+          </a:ln>
+        </p:spPr>
+        <p:style>
+          <a:lnRef idx="1">
+            <a:schemeClr val="accent1"/>
+          </a:lnRef>
+          <a:fillRef idx="0">
+            <a:schemeClr val="accent1"/>
+          </a:fillRef>
+          <a:effectRef idx="0">
+            <a:schemeClr val="accent1"/>
+          </a:effectRef>
+          <a:fontRef idx="minor">
+            <a:schemeClr val="tx1"/>
+          </a:fontRef>
+        </p:style>
+      </p:cxnSp>
+      <p:sp>
+        <p:nvSpPr>
+          <p:cNvPr id="31" name="TextBox 30"/>
+          <p:cNvSpPr txBox="1"/>
+          <p:nvPr/>
+        </p:nvSpPr>
+        <p:spPr>
+          <a:xfrm>
+            <a:off x="4832108" y="2589431"/>
+            <a:ext cx="428322" cy="369332"/>
+          </a:xfrm>
+          <a:prstGeom prst="rect">
+            <a:avLst/>
+          </a:prstGeom>
+          <a:noFill/>
+        </p:spPr>
+        <p:txBody>
+          <a:bodyPr wrap="none" rtlCol="0">
+            <a:spAutoFit/>
+          </a:bodyPr>
+          <a:lstStyle/>
+          <a:p>
+            <a:r>
+              <a:rPr lang="en-US" dirty="0" smtClean="0"/>
+              <a:t>no</a:t>
+            </a:r>
+            <a:endParaRPr lang="en-US" dirty="0"/>
+          </a:p>
+        </p:txBody>
+      </p:sp>
+      <p:sp>
+        <p:nvSpPr>
+          <p:cNvPr id="34" name="TextBox 33"/>
+          <p:cNvSpPr txBox="1"/>
+          <p:nvPr/>
+        </p:nvSpPr>
+        <p:spPr>
+          <a:xfrm>
+            <a:off x="7092412" y="2563535"/>
+            <a:ext cx="804003" cy="369332"/>
+          </a:xfrm>
+          <a:prstGeom prst="rect">
+            <a:avLst/>
+          </a:prstGeom>
+          <a:noFill/>
+        </p:spPr>
+        <p:txBody>
+          <a:bodyPr wrap="none" rtlCol="0">
+            <a:spAutoFit/>
+          </a:bodyPr>
+          <a:lstStyle/>
+          <a:p>
+            <a:r>
+              <a:rPr lang="en-US" dirty="0" smtClean="0"/>
+              <a:t>accept</a:t>
+            </a:r>
+            <a:endParaRPr lang="en-US" dirty="0"/>
+          </a:p>
+        </p:txBody>
+      </p:sp>
+      <p:sp>
+        <p:nvSpPr>
+          <p:cNvPr id="35" name="Flowchart: Decision 34"/>
+          <p:cNvSpPr/>
+          <p:nvPr/>
+        </p:nvSpPr>
+        <p:spPr>
+          <a:xfrm>
+            <a:off x="6263025" y="1553217"/>
+            <a:ext cx="1552047" cy="1036214"/>
+          </a:xfrm>
+          <a:prstGeom prst="flowChartDecision">
+            <a:avLst/>
+          </a:prstGeom>
+          <a:noFill/>
+          <a:ln w="31750">
+            <a:solidFill>
+              <a:schemeClr val="tx1"/>
+            </a:solidFill>
+          </a:ln>
+        </p:spPr>
+        <p:style>
+          <a:lnRef idx="2">
+            <a:schemeClr val="accent1">
+              <a:shade val="50000"/>
+            </a:schemeClr>
+          </a:lnRef>
+          <a:fillRef idx="1">
+            <a:schemeClr val="accent1"/>
+          </a:fillRef>
+          <a:effectRef idx="0">
+            <a:schemeClr val="accent1"/>
+          </a:effectRef>
+          <a:fontRef idx="minor">
+            <a:schemeClr val="lt1"/>
+          </a:fontRef>
+        </p:style>
+        <p:txBody>
+          <a:bodyPr rtlCol="0" anchor="ctr"/>
+          <a:lstStyle/>
+          <a:p>
+            <a:pPr algn="ctr"/>
+            <a:r>
+              <a:rPr lang="en-US" sz="1200" dirty="0" smtClean="0">
+                <a:solidFill>
+                  <a:schemeClr val="tx1"/>
+                </a:solidFill>
+              </a:rPr>
+              <a:t>Executive decision</a:t>
+            </a:r>
+            <a:endParaRPr lang="en-US" sz="1200" dirty="0">
+              <a:solidFill>
+                <a:schemeClr val="tx1"/>
+              </a:solidFill>
+            </a:endParaRPr>
+          </a:p>
+        </p:txBody>
+      </p:sp>
+      <p:cxnSp>
+        <p:nvCxnSpPr>
+          <p:cNvPr id="36" name="Straight Arrow Connector 35"/>
+          <p:cNvCxnSpPr>
+            <a:stCxn id="23" idx="3"/>
+            <a:endCxn id="35" idx="1"/>
+          </p:cNvCxnSpPr>
+          <p:nvPr/>
+        </p:nvCxnSpPr>
+        <p:spPr>
+          <a:xfrm>
+            <a:off x="5691160" y="2068960"/>
+            <a:ext cx="571865" cy="2364"/>
+          </a:xfrm>
+          <a:prstGeom prst="straightConnector1">
+            <a:avLst/>
+          </a:prstGeom>
+          <a:ln w="31750">
+            <a:solidFill>
+              <a:schemeClr val="tx1"/>
+            </a:solidFill>
+            <a:tailEnd type="triangle" w="lg" len="lg"/>
+          </a:ln>
+        </p:spPr>
+        <p:style>
+          <a:lnRef idx="1">
+            <a:schemeClr val="accent1"/>
+          </a:lnRef>
+          <a:fillRef idx="0">
+            <a:schemeClr val="accent1"/>
+          </a:fillRef>
+          <a:effectRef idx="0">
+            <a:schemeClr val="accent1"/>
+          </a:effectRef>
+          <a:fontRef idx="minor">
+            <a:schemeClr val="tx1"/>
+          </a:fontRef>
+        </p:style>
+      </p:cxnSp>
+      <p:sp>
+        <p:nvSpPr>
+          <p:cNvPr id="37" name="TextBox 36"/>
+          <p:cNvSpPr txBox="1"/>
+          <p:nvPr/>
+        </p:nvSpPr>
+        <p:spPr>
+          <a:xfrm>
+            <a:off x="5046269" y="641263"/>
+            <a:ext cx="1852174" cy="307777"/>
+          </a:xfrm>
+          <a:prstGeom prst="rect">
+            <a:avLst/>
+          </a:prstGeom>
+          <a:noFill/>
+        </p:spPr>
+        <p:txBody>
+          <a:bodyPr wrap="none" rtlCol="0">
+            <a:spAutoFit/>
+          </a:bodyPr>
+          <a:lstStyle/>
+          <a:p>
+            <a:r>
+              <a:rPr lang="en-US" sz="1400" dirty="0" smtClean="0"/>
+              <a:t>return to public review</a:t>
+            </a:r>
+            <a:endParaRPr lang="en-US" sz="1400" dirty="0"/>
+          </a:p>
+        </p:txBody>
+      </p:sp>
+      <p:sp>
+        <p:nvSpPr>
+          <p:cNvPr id="38" name="TextBox 37"/>
+          <p:cNvSpPr txBox="1"/>
+          <p:nvPr/>
+        </p:nvSpPr>
+        <p:spPr>
+          <a:xfrm>
+            <a:off x="5653881" y="2088742"/>
+            <a:ext cx="491225" cy="369332"/>
+          </a:xfrm>
+          <a:prstGeom prst="rect">
+            <a:avLst/>
+          </a:prstGeom>
+          <a:noFill/>
+        </p:spPr>
+        <p:txBody>
+          <a:bodyPr wrap="none" rtlCol="0">
+            <a:spAutoFit/>
+          </a:bodyPr>
+          <a:lstStyle/>
+          <a:p>
+            <a:r>
+              <a:rPr lang="en-US" dirty="0" smtClean="0"/>
+              <a:t>yes</a:t>
+            </a:r>
+            <a:endParaRPr lang="en-US" dirty="0"/>
+          </a:p>
+        </p:txBody>
+      </p:sp>
+      <p:cxnSp>
+        <p:nvCxnSpPr>
+          <p:cNvPr id="39" name="Straight Arrow Connector 38"/>
+          <p:cNvCxnSpPr>
+            <a:stCxn id="35" idx="2"/>
+          </p:cNvCxnSpPr>
+          <p:nvPr/>
+        </p:nvCxnSpPr>
+        <p:spPr>
+          <a:xfrm flipH="1">
+            <a:off x="7039048" y="2589431"/>
+            <a:ext cx="1" cy="559677"/>
+          </a:xfrm>
+          <a:prstGeom prst="straightConnector1">
+            <a:avLst/>
+          </a:prstGeom>
+          <a:ln w="31750">
+            <a:solidFill>
+              <a:schemeClr val="tx1"/>
+            </a:solidFill>
+            <a:tailEnd type="triangle" w="lg" len="lg"/>
+          </a:ln>
+        </p:spPr>
+        <p:style>
+          <a:lnRef idx="1">
+            <a:schemeClr val="accent1"/>
+          </a:lnRef>
+          <a:fillRef idx="0">
+            <a:schemeClr val="accent1"/>
+          </a:fillRef>
+          <a:effectRef idx="0">
+            <a:schemeClr val="accent1"/>
+          </a:effectRef>
+          <a:fontRef idx="minor">
+            <a:schemeClr val="tx1"/>
+          </a:fontRef>
+        </p:style>
+      </p:cxnSp>
+      <p:sp>
+        <p:nvSpPr>
+          <p:cNvPr id="40" name="TextBox 39"/>
+          <p:cNvSpPr txBox="1"/>
+          <p:nvPr/>
+        </p:nvSpPr>
+        <p:spPr>
+          <a:xfrm>
+            <a:off x="6170556" y="3166756"/>
+            <a:ext cx="1798152" cy="523220"/>
+          </a:xfrm>
+          <a:prstGeom prst="rect">
+            <a:avLst/>
+          </a:prstGeom>
+          <a:noFill/>
+        </p:spPr>
+        <p:txBody>
+          <a:bodyPr wrap="square" rtlCol="0">
+            <a:spAutoFit/>
+          </a:bodyPr>
+          <a:lstStyle/>
+          <a:p>
+            <a:r>
+              <a:rPr lang="en-US" sz="1400" dirty="0"/>
+              <a:t>c</a:t>
+            </a:r>
+            <a:r>
+              <a:rPr lang="en-US" sz="1400" dirty="0" smtClean="0"/>
+              <a:t>hange implemented in documentation</a:t>
+            </a:r>
+            <a:endParaRPr lang="en-US" sz="1400" dirty="0"/>
+          </a:p>
+        </p:txBody>
+      </p:sp>
+      <p:sp>
+        <p:nvSpPr>
+          <p:cNvPr id="41" name="TextBox 40"/>
+          <p:cNvSpPr txBox="1"/>
+          <p:nvPr/>
+        </p:nvSpPr>
+        <p:spPr>
+          <a:xfrm>
+            <a:off x="797100" y="4480863"/>
+            <a:ext cx="2375971" cy="307777"/>
+          </a:xfrm>
+          <a:prstGeom prst="rect">
+            <a:avLst/>
+          </a:prstGeom>
+          <a:noFill/>
+        </p:spPr>
+        <p:txBody>
+          <a:bodyPr wrap="none" rtlCol="0">
+            <a:spAutoFit/>
+          </a:bodyPr>
+          <a:lstStyle/>
+          <a:p>
+            <a:r>
+              <a:rPr lang="en-US" sz="1400" dirty="0" smtClean="0"/>
+              <a:t>Fig. x. General change process</a:t>
+            </a:r>
+            <a:endParaRPr lang="en-US" sz="1400" dirty="0"/>
+          </a:p>
+        </p:txBody>
+      </p:sp>
+      <p:sp>
+        <p:nvSpPr>
+          <p:cNvPr id="42" name="TextBox 41"/>
+          <p:cNvSpPr txBox="1"/>
+          <p:nvPr/>
+        </p:nvSpPr>
+        <p:spPr>
+          <a:xfrm>
+            <a:off x="0" y="1855206"/>
+            <a:ext cx="886632" cy="523220"/>
+          </a:xfrm>
+          <a:prstGeom prst="rect">
+            <a:avLst/>
+          </a:prstGeom>
+          <a:noFill/>
+        </p:spPr>
+        <p:txBody>
+          <a:bodyPr wrap="square" rtlCol="0">
+            <a:spAutoFit/>
+          </a:bodyPr>
+          <a:lstStyle/>
+          <a:p>
+            <a:r>
+              <a:rPr lang="en-US" sz="1400" dirty="0" smtClean="0"/>
+              <a:t>Change proposed</a:t>
+            </a:r>
+            <a:endParaRPr lang="en-US" sz="1400" dirty="0"/>
+          </a:p>
+        </p:txBody>
+      </p:sp>
+      <p:sp>
+        <p:nvSpPr>
+          <p:cNvPr id="47" name="TextBox 46"/>
+          <p:cNvSpPr txBox="1"/>
+          <p:nvPr/>
+        </p:nvSpPr>
+        <p:spPr>
+          <a:xfrm>
+            <a:off x="3707076" y="3168637"/>
+            <a:ext cx="2040251" cy="738664"/>
+          </a:xfrm>
+          <a:prstGeom prst="rect">
+            <a:avLst/>
+          </a:prstGeom>
+          <a:noFill/>
+        </p:spPr>
+        <p:txBody>
+          <a:bodyPr wrap="square" rtlCol="0">
+            <a:spAutoFit/>
+          </a:bodyPr>
+          <a:lstStyle/>
+          <a:p>
+            <a:r>
+              <a:rPr lang="en-US" sz="1400" dirty="0" smtClean="0"/>
+              <a:t>revise proposal and reset public comment period,  or close issue</a:t>
+            </a:r>
+            <a:endParaRPr lang="en-US" sz="1400" dirty="0"/>
+          </a:p>
+        </p:txBody>
+      </p:sp>
+      <p:cxnSp>
+        <p:nvCxnSpPr>
+          <p:cNvPr id="48" name="Straight Arrow Connector 47"/>
+          <p:cNvCxnSpPr>
+            <a:stCxn id="23" idx="2"/>
+          </p:cNvCxnSpPr>
+          <p:nvPr/>
+        </p:nvCxnSpPr>
+        <p:spPr>
+          <a:xfrm>
+            <a:off x="4727202" y="2567570"/>
+            <a:ext cx="0" cy="581538"/>
+          </a:xfrm>
+          <a:prstGeom prst="straightConnector1">
+            <a:avLst/>
+          </a:prstGeom>
+          <a:ln w="31750">
+            <a:solidFill>
+              <a:schemeClr val="tx1"/>
+            </a:solidFill>
+            <a:tailEnd type="triangle" w="lg" len="lg"/>
+          </a:ln>
+        </p:spPr>
+        <p:style>
+          <a:lnRef idx="1">
+            <a:schemeClr val="accent1"/>
+          </a:lnRef>
+          <a:fillRef idx="0">
+            <a:schemeClr val="accent1"/>
+          </a:fillRef>
+          <a:effectRef idx="0">
+            <a:schemeClr val="accent1"/>
+          </a:effectRef>
+          <a:fontRef idx="minor">
+            <a:schemeClr val="tx1"/>
+          </a:fontRef>
+        </p:style>
+      </p:cxnSp>
+      <p:cxnSp>
+        <p:nvCxnSpPr>
+          <p:cNvPr id="51" name="Elbow Connector 50"/>
+          <p:cNvCxnSpPr>
+            <a:endCxn id="23" idx="0"/>
+          </p:cNvCxnSpPr>
+          <p:nvPr/>
+        </p:nvCxnSpPr>
+        <p:spPr>
+          <a:xfrm rot="10800000" flipV="1">
+            <a:off x="4727202" y="1042233"/>
+            <a:ext cx="2311846" cy="528115"/>
+          </a:xfrm>
+          <a:prstGeom prst="bentConnector2">
+            <a:avLst/>
+          </a:prstGeom>
+          <a:ln w="31750">
+            <a:solidFill>
+              <a:schemeClr val="tx1"/>
+            </a:solidFill>
+            <a:tailEnd type="triangle" w="lg" len="lg"/>
+          </a:ln>
+        </p:spPr>
+        <p:style>
+          <a:lnRef idx="1">
+            <a:schemeClr val="accent1"/>
+          </a:lnRef>
+          <a:fillRef idx="0">
+            <a:schemeClr val="accent1"/>
+          </a:fillRef>
+          <a:effectRef idx="0">
+            <a:schemeClr val="accent1"/>
+          </a:effectRef>
+          <a:fontRef idx="minor">
+            <a:schemeClr val="tx1"/>
+          </a:fontRef>
+        </p:style>
+      </p:cxnSp>
+      <p:cxnSp>
+        <p:nvCxnSpPr>
+          <p:cNvPr id="68" name="Straight Arrow Connector 67"/>
+          <p:cNvCxnSpPr>
+            <a:stCxn id="35" idx="3"/>
+            <a:endCxn id="82" idx="1"/>
+          </p:cNvCxnSpPr>
+          <p:nvPr/>
+        </p:nvCxnSpPr>
+        <p:spPr>
+          <a:xfrm flipV="1">
+            <a:off x="7815072" y="2062891"/>
+            <a:ext cx="514568" cy="8433"/>
+          </a:xfrm>
+          <a:prstGeom prst="straightConnector1">
+            <a:avLst/>
+          </a:prstGeom>
+          <a:ln w="31750">
+            <a:solidFill>
+              <a:schemeClr val="tx1"/>
+            </a:solidFill>
+            <a:tailEnd type="triangle" w="lg" len="lg"/>
+          </a:ln>
+        </p:spPr>
+        <p:style>
+          <a:lnRef idx="1">
+            <a:schemeClr val="accent1"/>
+          </a:lnRef>
+          <a:fillRef idx="0">
+            <a:schemeClr val="accent1"/>
+          </a:fillRef>
+          <a:effectRef idx="0">
+            <a:schemeClr val="accent1"/>
+          </a:effectRef>
+          <a:fontRef idx="minor">
+            <a:schemeClr val="tx1"/>
+          </a:fontRef>
+        </p:style>
+      </p:cxnSp>
+      <p:sp>
+        <p:nvSpPr>
+          <p:cNvPr id="73" name="TextBox 72"/>
+          <p:cNvSpPr txBox="1"/>
+          <p:nvPr/>
+        </p:nvSpPr>
+        <p:spPr>
+          <a:xfrm>
+            <a:off x="7607776" y="2077259"/>
+            <a:ext cx="721864" cy="369332"/>
+          </a:xfrm>
+          <a:prstGeom prst="rect">
+            <a:avLst/>
+          </a:prstGeom>
+          <a:noFill/>
+        </p:spPr>
+        <p:txBody>
+          <a:bodyPr wrap="none" rtlCol="0">
+            <a:spAutoFit/>
+          </a:bodyPr>
+          <a:lstStyle/>
+          <a:p>
+            <a:r>
+              <a:rPr lang="en-US" dirty="0" smtClean="0"/>
+              <a:t>reject</a:t>
+            </a:r>
+            <a:endParaRPr lang="en-US" dirty="0"/>
+          </a:p>
+        </p:txBody>
+      </p:sp>
+      <p:sp>
+        <p:nvSpPr>
+          <p:cNvPr id="82" name="TextBox 81"/>
+          <p:cNvSpPr txBox="1"/>
+          <p:nvPr/>
+        </p:nvSpPr>
+        <p:spPr>
+          <a:xfrm>
+            <a:off x="8329640" y="1801281"/>
+            <a:ext cx="720795" cy="523220"/>
+          </a:xfrm>
+          <a:prstGeom prst="rect">
+            <a:avLst/>
+          </a:prstGeom>
+          <a:noFill/>
+        </p:spPr>
+        <p:txBody>
+          <a:bodyPr wrap="square" rtlCol="0">
+            <a:spAutoFit/>
+          </a:bodyPr>
+          <a:lstStyle/>
+          <a:p>
+            <a:r>
+              <a:rPr lang="en-US" sz="1400" dirty="0" smtClean="0"/>
+              <a:t>no change</a:t>
+            </a:r>
+            <a:endParaRPr lang="en-US" sz="1400" dirty="0"/>
+          </a:p>
+        </p:txBody>
+      </p:sp>
+    </p:spTree>
+    <p:extLst>
+      <p:ext uri="{BB962C8B-B14F-4D97-AF65-F5344CB8AC3E}">
+        <p14:creationId xmlns:p14="http://schemas.microsoft.com/office/powerpoint/2010/main" val="2962345159"/>
+      </p:ext>
+    </p:extLst>
+  </p:cSld>
+  <p:clrMapOvr>
+    <a:masterClrMapping/>
+  </p:clrMapOvr>
 </p:sld>
 </file>
 

</xml_diff>

<commit_message>
changes for submission for public comment
</commit_message>
<xml_diff>
--- a/diagrams.pptx
+++ b/diagrams.pptx
@@ -6158,7 +6158,7 @@
         </p:nvSpPr>
         <p:spPr>
           <a:xfrm>
-            <a:off x="6071764" y="465591"/>
+            <a:off x="6169300" y="523919"/>
             <a:ext cx="2974700" cy="523220"/>
           </a:xfrm>
           <a:prstGeom prst="rect">
@@ -6174,15 +6174,7 @@
           <a:p>
             <a:r>
               <a:rPr lang="en-US" sz="1400" dirty="0" smtClean="0"/>
-              <a:t>Interest Group makes changes and notifies community via </a:t>
-            </a:r>
-            <a:r>
-              <a:rPr lang="en-US" sz="1400" dirty="0" err="1" smtClean="0"/>
-              <a:t>tdwg</a:t>
-            </a:r>
-            <a:r>
-              <a:rPr lang="en-US" sz="1400" dirty="0" smtClean="0"/>
-              <a:t>-content</a:t>
+              <a:t>Interest Group makes changes and notifies community via tdwg-content</a:t>
             </a:r>
             <a:endParaRPr lang="en-US" sz="1400" dirty="0"/>
           </a:p>

</xml_diff>